<commit_message>
[Presentation] Second Draft for 30th Nov 2016
Changes:
- add slides to 30th_Nov
</commit_message>
<xml_diff>
--- a/Java_Class_30th_Nov.pptx
+++ b/Java_Class_30th_Nov.pptx
@@ -10,12 +10,7 @@
     <p:sldId id="264" r:id="rId5"/>
     <p:sldId id="265" r:id="rId6"/>
     <p:sldId id="266" r:id="rId7"/>
-    <p:sldId id="256" r:id="rId8"/>
-    <p:sldId id="257" r:id="rId9"/>
-    <p:sldId id="258" r:id="rId10"/>
-    <p:sldId id="259" r:id="rId11"/>
-    <p:sldId id="260" r:id="rId12"/>
-    <p:sldId id="261" r:id="rId13"/>
+    <p:sldId id="273" r:id="rId8"/>
   </p:sldIdLst>
   <p:sldSz cx="9144000" cy="6858000" type="screen4x3"/>
   <p:notesSz cx="7103745" cy="10234295"/>
@@ -2645,8 +2640,8 @@
         </p:nvSpPr>
         <p:spPr>
           <a:xfrm>
-            <a:off x="4059555" y="2985135"/>
-            <a:ext cx="1024890" cy="1014095"/>
+            <a:off x="977265" y="1431290"/>
+            <a:ext cx="7134225" cy="3757295"/>
           </a:xfrm>
           <a:prstGeom prst="rect">
             <a:avLst/>
@@ -2654,54 +2649,34 @@
           <a:noFill/>
         </p:spPr>
         <p:txBody>
-          <a:bodyPr wrap="none" rtlCol="0">
+          <a:bodyPr wrap="square" rtlCol="0">
             <a:spAutoFit/>
           </a:bodyPr>
           <a:p>
+            <a:pPr algn="ctr"/>
             <a:r>
               <a:rPr lang="en-MY" altLang="en-US" sz="6000"/>
-              <a:t>Hi.</a:t>
+              <a:t>Hi. </a:t>
             </a:r>
             <a:endParaRPr lang="en-MY" altLang="en-US" sz="6000"/>
           </a:p>
-        </p:txBody>
-      </p:sp>
-    </p:spTree>
-  </p:cSld>
-  <p:clrMapOvr>
-    <a:masterClrMapping/>
-  </p:clrMapOvr>
-</p:sld>
-</file>
-
-<file path=ppt/slides/slide10.xml><?xml version="1.0" encoding="utf-8"?>
-<p:sld xmlns:a="http://schemas.openxmlformats.org/drawingml/2006/main" xmlns:r="http://schemas.openxmlformats.org/officeDocument/2006/relationships" xmlns:p="http://schemas.openxmlformats.org/presentationml/2006/main">
-  <p:cSld>
-    <p:spTree>
-      <p:nvGrpSpPr>
-        <p:cNvPr id="1" name=""/>
-        <p:cNvGrpSpPr/>
-        <p:nvPr/>
-      </p:nvGrpSpPr>
-      <p:grpSpPr/>
-    </p:spTree>
-  </p:cSld>
-  <p:clrMapOvr>
-    <a:masterClrMapping/>
-  </p:clrMapOvr>
-</p:sld>
-</file>
-
-<file path=ppt/slides/slide11.xml><?xml version="1.0" encoding="utf-8"?>
-<p:sld xmlns:a="http://schemas.openxmlformats.org/drawingml/2006/main" xmlns:r="http://schemas.openxmlformats.org/officeDocument/2006/relationships" xmlns:p="http://schemas.openxmlformats.org/presentationml/2006/main">
-  <p:cSld>
-    <p:spTree>
-      <p:nvGrpSpPr>
-        <p:cNvPr id="1" name=""/>
-        <p:cNvGrpSpPr/>
-        <p:nvPr/>
-      </p:nvGrpSpPr>
-      <p:grpSpPr/>
+          <a:p>
+            <a:pPr algn="ctr"/>
+            <a:r>
+              <a:rPr lang="en-MY" altLang="en-US" sz="6000"/>
+              <a:t>I have only 6 slides for you today.</a:t>
+            </a:r>
+            <a:br>
+              <a:rPr lang="en-MY" altLang="en-US" sz="6000"/>
+            </a:br>
+            <a:r>
+              <a:rPr lang="en-MY" altLang="en-US" sz="6000"/>
+              <a:t>Good luck.</a:t>
+            </a:r>
+            <a:endParaRPr lang="en-MY" altLang="en-US" sz="6000"/>
+          </a:p>
+        </p:txBody>
+      </p:sp>
     </p:spTree>
   </p:cSld>
   <p:clrMapOvr>
@@ -2892,14 +2867,14 @@
       </p:sp>
       <p:sp>
         <p:nvSpPr>
-          <p:cNvPr id="8" name="Text Box 7"/>
+          <p:cNvPr id="3" name="Text Box 2"/>
           <p:cNvSpPr txBox="1"/>
           <p:nvPr/>
         </p:nvSpPr>
         <p:spPr>
           <a:xfrm>
-            <a:off x="1128395" y="4383405"/>
-            <a:ext cx="7279640" cy="642620"/>
+            <a:off x="1296670" y="4229735"/>
+            <a:ext cx="3199765" cy="368300"/>
           </a:xfrm>
           <a:prstGeom prst="rect">
             <a:avLst/>
@@ -2914,25 +2889,85 @@
             <a:pPr algn="ctr"/>
             <a:r>
               <a:rPr lang="en-MY" altLang="en-US"/>
-              <a:t>What it does in human terms: it turns the class </a:t>
-            </a:r>
-            <a:r>
-              <a:rPr lang="en-MY" altLang="en-US">
-                <a:latin typeface="Lucida Console" panose="020B0609040504020204" charset="0"/>
-              </a:rPr>
-              <a:t>BaseGame</a:t>
-            </a:r>
+              <a:t>I mean, if you don't believe me...</a:t>
+            </a:r>
+            <a:endParaRPr lang="en-MY" altLang="en-US"/>
+          </a:p>
+        </p:txBody>
+      </p:sp>
+      <p:pic>
+        <p:nvPicPr>
+          <p:cNvPr id="9" name="Picture 8" descr="Capture"/>
+          <p:cNvPicPr>
+            <a:picLocks noChangeAspect="1"/>
+          </p:cNvPicPr>
+          <p:nvPr/>
+        </p:nvPicPr>
+        <p:blipFill>
+          <a:blip r:embed="rId2"/>
+          <a:stretch>
+            <a:fillRect/>
+          </a:stretch>
+        </p:blipFill>
+        <p:spPr>
+          <a:xfrm>
+            <a:off x="2887980" y="4598035"/>
+            <a:ext cx="3885565" cy="419100"/>
+          </a:xfrm>
+          <a:prstGeom prst="rect">
+            <a:avLst/>
+          </a:prstGeom>
+        </p:spPr>
+      </p:pic>
+      <p:pic>
+        <p:nvPicPr>
+          <p:cNvPr id="10" name="Picture 9"/>
+          <p:cNvPicPr>
+            <a:picLocks noChangeAspect="1"/>
+          </p:cNvPicPr>
+          <p:nvPr/>
+        </p:nvPicPr>
+        <p:blipFill>
+          <a:blip r:embed="rId3"/>
+          <a:stretch>
+            <a:fillRect/>
+          </a:stretch>
+        </p:blipFill>
+        <p:spPr>
+          <a:xfrm>
+            <a:off x="2990215" y="5017135"/>
+            <a:ext cx="3680460" cy="400050"/>
+          </a:xfrm>
+          <a:prstGeom prst="rect">
+            <a:avLst/>
+          </a:prstGeom>
+        </p:spPr>
+      </p:pic>
+      <p:sp>
+        <p:nvSpPr>
+          <p:cNvPr id="11" name="Text Box 10"/>
+          <p:cNvSpPr txBox="1"/>
+          <p:nvPr/>
+        </p:nvSpPr>
+        <p:spPr>
+          <a:xfrm>
+            <a:off x="1418590" y="5536565"/>
+            <a:ext cx="6468110" cy="642620"/>
+          </a:xfrm>
+          <a:prstGeom prst="rect">
+            <a:avLst/>
+          </a:prstGeom>
+          <a:noFill/>
+        </p:spPr>
+        <p:txBody>
+          <a:bodyPr wrap="square" rtlCol="0">
+            <a:spAutoFit/>
+          </a:bodyPr>
+          <a:p>
+            <a:pPr algn="ctr"/>
             <a:r>
               <a:rPr lang="en-MY" altLang="en-US"/>
-              <a:t> into an idea.</a:t>
-            </a:r>
-            <a:endParaRPr lang="en-MY" altLang="en-US"/>
-          </a:p>
-          <a:p>
-            <a:pPr algn="ctr"/>
-            <a:r>
-              <a:rPr lang="en-MY" altLang="en-US"/>
-              <a:t>An idea, no more, no less. It cannot be instantiated, only extended.</a:t>
+              <a:t>If the idea analogy doesn't help, think of abstract classes as ideas that need to be filled with execution.</a:t>
             </a:r>
             <a:endParaRPr lang="en-MY" altLang="en-US"/>
           </a:p>
@@ -2985,6 +3020,298 @@
           </a:p>
         </p:txBody>
       </p:sp>
+      <p:sp>
+        <p:nvSpPr>
+          <p:cNvPr id="4" name="Text Box 3"/>
+          <p:cNvSpPr txBox="1"/>
+          <p:nvPr/>
+        </p:nvSpPr>
+        <p:spPr>
+          <a:xfrm>
+            <a:off x="950595" y="1174750"/>
+            <a:ext cx="4199255" cy="368300"/>
+          </a:xfrm>
+          <a:prstGeom prst="rect">
+            <a:avLst/>
+          </a:prstGeom>
+          <a:noFill/>
+        </p:spPr>
+        <p:txBody>
+          <a:bodyPr wrap="none" rtlCol="0">
+            <a:spAutoFit/>
+          </a:bodyPr>
+          <a:p>
+            <a:r>
+              <a:rPr lang="en-MY" altLang="en-US"/>
+              <a:t>Once you </a:t>
+            </a:r>
+            <a:r>
+              <a:rPr lang="en-MY" altLang="en-US">
+                <a:latin typeface="Lucida Console" panose="020B0609040504020204" charset="0"/>
+              </a:rPr>
+              <a:t>extend</a:t>
+            </a:r>
+            <a:r>
+              <a:rPr lang="en-MY" altLang="en-US">
+                <a:latin typeface="Calibri" panose="020F0502020204030204" charset="0"/>
+              </a:rPr>
+              <a:t> the </a:t>
+            </a:r>
+            <a:r>
+              <a:rPr lang="en-MY" altLang="en-US">
+                <a:latin typeface="Lucida Console" panose="020B0609040504020204" charset="0"/>
+              </a:rPr>
+              <a:t>abstract </a:t>
+            </a:r>
+            <a:r>
+              <a:rPr lang="en-MY" altLang="en-US">
+                <a:latin typeface="Calibri" panose="020F0502020204030204" charset="0"/>
+              </a:rPr>
+              <a:t>class...</a:t>
+            </a:r>
+            <a:endParaRPr lang="en-MY" altLang="en-US">
+              <a:latin typeface="Calibri" panose="020F0502020204030204" charset="0"/>
+            </a:endParaRPr>
+          </a:p>
+        </p:txBody>
+      </p:sp>
+      <p:pic>
+        <p:nvPicPr>
+          <p:cNvPr id="5" name="Picture 4" descr="Capture"/>
+          <p:cNvPicPr>
+            <a:picLocks noChangeAspect="1"/>
+          </p:cNvPicPr>
+          <p:nvPr/>
+        </p:nvPicPr>
+        <p:blipFill>
+          <a:blip r:embed="rId1"/>
+          <a:stretch>
+            <a:fillRect/>
+          </a:stretch>
+        </p:blipFill>
+        <p:spPr>
+          <a:xfrm>
+            <a:off x="1088390" y="1678940"/>
+            <a:ext cx="6966585" cy="516255"/>
+          </a:xfrm>
+          <a:prstGeom prst="rect">
+            <a:avLst/>
+          </a:prstGeom>
+        </p:spPr>
+      </p:pic>
+      <p:sp>
+        <p:nvSpPr>
+          <p:cNvPr id="6" name="Text Box 5"/>
+          <p:cNvSpPr txBox="1"/>
+          <p:nvPr/>
+        </p:nvSpPr>
+        <p:spPr>
+          <a:xfrm>
+            <a:off x="1267460" y="2360295"/>
+            <a:ext cx="6609715" cy="642620"/>
+          </a:xfrm>
+          <a:prstGeom prst="rect">
+            <a:avLst/>
+          </a:prstGeom>
+          <a:noFill/>
+        </p:spPr>
+        <p:txBody>
+          <a:bodyPr wrap="square" rtlCol="0">
+            <a:spAutoFit/>
+          </a:bodyPr>
+          <a:p>
+            <a:pPr algn="ctr"/>
+            <a:r>
+              <a:rPr lang="en-MY" altLang="en-US"/>
+              <a:t>You may use all the methods and attributes as determined by their privacy factor in the </a:t>
+            </a:r>
+            <a:r>
+              <a:rPr lang="en-MY" altLang="en-US">
+                <a:latin typeface="Lucida Console" panose="020B0609040504020204" charset="0"/>
+              </a:rPr>
+              <a:t>abstract</a:t>
+            </a:r>
+            <a:r>
+              <a:rPr lang="en-MY" altLang="en-US">
+                <a:latin typeface="Calibri" panose="020F0502020204030204" charset="0"/>
+              </a:rPr>
+              <a:t> class</a:t>
+            </a:r>
+            <a:r>
+              <a:rPr lang="en-MY" altLang="en-US"/>
+              <a:t>.</a:t>
+            </a:r>
+            <a:endParaRPr lang="en-MY" altLang="en-US"/>
+          </a:p>
+        </p:txBody>
+      </p:sp>
+      <p:pic>
+        <p:nvPicPr>
+          <p:cNvPr id="7" name="Picture 6" descr="Capture"/>
+          <p:cNvPicPr>
+            <a:picLocks noChangeAspect="1"/>
+          </p:cNvPicPr>
+          <p:nvPr/>
+        </p:nvPicPr>
+        <p:blipFill>
+          <a:blip r:embed="rId2"/>
+          <a:stretch>
+            <a:fillRect/>
+          </a:stretch>
+        </p:blipFill>
+        <p:spPr>
+          <a:xfrm>
+            <a:off x="2780030" y="3002915"/>
+            <a:ext cx="3581400" cy="966470"/>
+          </a:xfrm>
+          <a:prstGeom prst="rect">
+            <a:avLst/>
+          </a:prstGeom>
+        </p:spPr>
+      </p:pic>
+      <p:sp>
+        <p:nvSpPr>
+          <p:cNvPr id="9" name="Text Box 8"/>
+          <p:cNvSpPr txBox="1"/>
+          <p:nvPr/>
+        </p:nvSpPr>
+        <p:spPr>
+          <a:xfrm>
+            <a:off x="1560195" y="3895725"/>
+            <a:ext cx="6021070" cy="916940"/>
+          </a:xfrm>
+          <a:prstGeom prst="rect">
+            <a:avLst/>
+          </a:prstGeom>
+          <a:noFill/>
+        </p:spPr>
+        <p:txBody>
+          <a:bodyPr wrap="square" rtlCol="0">
+            <a:spAutoFit/>
+          </a:bodyPr>
+          <a:p>
+            <a:pPr algn="ctr"/>
+            <a:r>
+              <a:rPr lang="en-MY" altLang="en-US"/>
+              <a:t>In fact, it ties fairly well into what we'll be talking about next, but a (probably the most) important note on </a:t>
+            </a:r>
+            <a:r>
+              <a:rPr lang="en-MY" altLang="en-US">
+                <a:latin typeface="Lucida Console" panose="020B0609040504020204" charset="0"/>
+              </a:rPr>
+              <a:t>abstract </a:t>
+            </a:r>
+            <a:r>
+              <a:rPr lang="en-MY" altLang="en-US"/>
+              <a:t>before we leave...</a:t>
+            </a:r>
+            <a:endParaRPr lang="en-MY" altLang="en-US"/>
+          </a:p>
+        </p:txBody>
+      </p:sp>
+      <p:sp>
+        <p:nvSpPr>
+          <p:cNvPr id="12" name="Text Box 11"/>
+          <p:cNvSpPr txBox="1"/>
+          <p:nvPr/>
+        </p:nvSpPr>
+        <p:spPr>
+          <a:xfrm>
+            <a:off x="2851785" y="4713605"/>
+            <a:ext cx="3441700" cy="368300"/>
+          </a:xfrm>
+          <a:prstGeom prst="rect">
+            <a:avLst/>
+          </a:prstGeom>
+          <a:noFill/>
+        </p:spPr>
+        <p:txBody>
+          <a:bodyPr wrap="none" rtlCol="0">
+            <a:spAutoFit/>
+          </a:bodyPr>
+          <a:p>
+            <a:r>
+              <a:rPr lang="en-MY" altLang="en-US" i="1"/>
+              <a:t>You can make methods abstract. </a:t>
+            </a:r>
+            <a:r>
+              <a:rPr lang="en-MY" altLang="en-US"/>
+              <a:t>:O</a:t>
+            </a:r>
+            <a:endParaRPr lang="en-MY" altLang="en-US"/>
+          </a:p>
+        </p:txBody>
+      </p:sp>
+      <p:pic>
+        <p:nvPicPr>
+          <p:cNvPr id="13" name="Picture 12" descr="Capture"/>
+          <p:cNvPicPr>
+            <a:picLocks noChangeAspect="1"/>
+          </p:cNvPicPr>
+          <p:nvPr/>
+        </p:nvPicPr>
+        <p:blipFill>
+          <a:blip r:embed="rId3"/>
+          <a:stretch>
+            <a:fillRect/>
+          </a:stretch>
+        </p:blipFill>
+        <p:spPr>
+          <a:xfrm>
+            <a:off x="2138680" y="5081905"/>
+            <a:ext cx="4863465" cy="361950"/>
+          </a:xfrm>
+          <a:prstGeom prst="rect">
+            <a:avLst/>
+          </a:prstGeom>
+        </p:spPr>
+      </p:pic>
+      <p:sp>
+        <p:nvSpPr>
+          <p:cNvPr id="14" name="Text Box 13"/>
+          <p:cNvSpPr txBox="1"/>
+          <p:nvPr/>
+        </p:nvSpPr>
+        <p:spPr>
+          <a:xfrm>
+            <a:off x="1664335" y="5520690"/>
+            <a:ext cx="5817235" cy="916940"/>
+          </a:xfrm>
+          <a:prstGeom prst="rect">
+            <a:avLst/>
+          </a:prstGeom>
+          <a:noFill/>
+        </p:spPr>
+        <p:txBody>
+          <a:bodyPr wrap="square" rtlCol="0">
+            <a:spAutoFit/>
+          </a:bodyPr>
+          <a:p>
+            <a:pPr algn="ctr"/>
+            <a:r>
+              <a:rPr lang="en-MY" altLang="en-US"/>
+              <a:t>Abstract methods require definition in their child classes, and is best used when you're sure a child will </a:t>
+            </a:r>
+            <a:r>
+              <a:rPr lang="en-MY" altLang="en-US" b="1" i="1"/>
+              <a:t>NEED </a:t>
+            </a:r>
+            <a:r>
+              <a:rPr lang="en-MY" altLang="en-US"/>
+              <a:t>this method but aren't sure </a:t>
+            </a:r>
+            <a:r>
+              <a:rPr lang="en-MY" altLang="en-US" i="1"/>
+              <a:t>how </a:t>
+            </a:r>
+            <a:r>
+              <a:rPr lang="en-MY" altLang="en-US"/>
+              <a:t>each child will implement them.</a:t>
+            </a:r>
+            <a:endParaRPr lang="en-MY" altLang="en-US"/>
+          </a:p>
+        </p:txBody>
+      </p:sp>
     </p:spTree>
   </p:cSld>
   <p:clrMapOvr>
@@ -3012,7 +3339,7 @@
         <p:spPr>
           <a:xfrm>
             <a:off x="508000" y="345440"/>
-            <a:ext cx="6604635" cy="829310"/>
+            <a:ext cx="3002915" cy="829310"/>
           </a:xfrm>
           <a:prstGeom prst="rect">
             <a:avLst/>
@@ -3026,9 +3353,179 @@
           <a:p>
             <a:r>
               <a:rPr lang="en-MY" altLang="en-US" sz="4800"/>
-              <a:t>Abstract - Dealing in Ideas</a:t>
+              <a:t>Inheritance</a:t>
             </a:r>
             <a:endParaRPr lang="en-MY" altLang="en-US" sz="4800"/>
+          </a:p>
+        </p:txBody>
+      </p:sp>
+      <p:sp>
+        <p:nvSpPr>
+          <p:cNvPr id="3" name="Text Box 2"/>
+          <p:cNvSpPr txBox="1"/>
+          <p:nvPr/>
+        </p:nvSpPr>
+        <p:spPr>
+          <a:xfrm>
+            <a:off x="768985" y="1254760"/>
+            <a:ext cx="7604760" cy="916940"/>
+          </a:xfrm>
+          <a:prstGeom prst="rect">
+            <a:avLst/>
+          </a:prstGeom>
+          <a:noFill/>
+        </p:spPr>
+        <p:txBody>
+          <a:bodyPr wrap="square" rtlCol="0">
+            <a:spAutoFit/>
+          </a:bodyPr>
+          <a:p>
+            <a:pPr algn="ctr"/>
+            <a:r>
+              <a:rPr lang="en-MY" altLang="en-US"/>
+              <a:t>The word is misleading, since no one - or in our case, nothing - dies.</a:t>
+            </a:r>
+            <a:endParaRPr lang="en-MY" altLang="en-US"/>
+          </a:p>
+          <a:p>
+            <a:pPr algn="ctr"/>
+            <a:r>
+              <a:rPr lang="en-MY" altLang="en-US"/>
+              <a:t>Inheritance is the idea that a child (sub) class can inherit certain properties and methods from the parent (super) class.</a:t>
+            </a:r>
+            <a:endParaRPr lang="en-MY" altLang="en-US"/>
+          </a:p>
+        </p:txBody>
+      </p:sp>
+      <p:sp>
+        <p:nvSpPr>
+          <p:cNvPr id="6" name="Text Box 5"/>
+          <p:cNvSpPr txBox="1"/>
+          <p:nvPr/>
+        </p:nvSpPr>
+        <p:spPr>
+          <a:xfrm>
+            <a:off x="1800860" y="4106545"/>
+            <a:ext cx="5540375" cy="1465580"/>
+          </a:xfrm>
+          <a:prstGeom prst="rect">
+            <a:avLst/>
+          </a:prstGeom>
+          <a:noFill/>
+        </p:spPr>
+        <p:txBody>
+          <a:bodyPr wrap="square" rtlCol="0">
+            <a:spAutoFit/>
+          </a:bodyPr>
+          <a:p>
+            <a:pPr algn="ctr"/>
+            <a:r>
+              <a:rPr lang="en-MY" altLang="en-US"/>
+              <a:t>The will analogy doesn't hold up - it's better to think of children </a:t>
+            </a:r>
+            <a:r>
+              <a:rPr lang="en-MY" altLang="en-US" b="1"/>
+              <a:t>inheriting </a:t>
+            </a:r>
+            <a:r>
+              <a:rPr lang="en-MY" altLang="en-US"/>
+              <a:t>certain </a:t>
+            </a:r>
+            <a:r>
+              <a:rPr lang="en-MY" altLang="en-US" b="1"/>
+              <a:t>properties </a:t>
+            </a:r>
+            <a:r>
+              <a:rPr lang="en-MY" altLang="en-US"/>
+              <a:t>from their parents (blue eyes, wide nose, big lips).</a:t>
+            </a:r>
+            <a:endParaRPr lang="en-MY" altLang="en-US"/>
+          </a:p>
+          <a:p>
+            <a:pPr algn="ctr"/>
+            <a:r>
+              <a:rPr lang="en-MY" altLang="en-US"/>
+              <a:t>Private properties don't get passed down to the child class either. </a:t>
+            </a:r>
+            <a:endParaRPr lang="en-MY" altLang="en-US"/>
+          </a:p>
+        </p:txBody>
+      </p:sp>
+      <p:pic>
+        <p:nvPicPr>
+          <p:cNvPr id="7" name="Picture 6" descr="Capture"/>
+          <p:cNvPicPr>
+            <a:picLocks noChangeAspect="1"/>
+          </p:cNvPicPr>
+          <p:nvPr/>
+        </p:nvPicPr>
+        <p:blipFill>
+          <a:blip r:embed="rId1"/>
+          <a:stretch>
+            <a:fillRect/>
+          </a:stretch>
+        </p:blipFill>
+        <p:spPr>
+          <a:xfrm>
+            <a:off x="1089025" y="2397125"/>
+            <a:ext cx="6966585" cy="516255"/>
+          </a:xfrm>
+          <a:prstGeom prst="rect">
+            <a:avLst/>
+          </a:prstGeom>
+        </p:spPr>
+      </p:pic>
+      <p:pic>
+        <p:nvPicPr>
+          <p:cNvPr id="8" name="Picture 7" descr="Capture"/>
+          <p:cNvPicPr>
+            <a:picLocks noChangeAspect="1"/>
+          </p:cNvPicPr>
+          <p:nvPr/>
+        </p:nvPicPr>
+        <p:blipFill>
+          <a:blip r:embed="rId2"/>
+          <a:stretch>
+            <a:fillRect/>
+          </a:stretch>
+        </p:blipFill>
+        <p:spPr>
+          <a:xfrm>
+            <a:off x="2780665" y="2945765"/>
+            <a:ext cx="3581400" cy="966470"/>
+          </a:xfrm>
+          <a:prstGeom prst="rect">
+            <a:avLst/>
+          </a:prstGeom>
+        </p:spPr>
+      </p:pic>
+      <p:sp>
+        <p:nvSpPr>
+          <p:cNvPr id="9" name="Text Box 8"/>
+          <p:cNvSpPr txBox="1"/>
+          <p:nvPr/>
+        </p:nvSpPr>
+        <p:spPr>
+          <a:xfrm>
+            <a:off x="2780665" y="5821680"/>
+            <a:ext cx="3569335" cy="368300"/>
+          </a:xfrm>
+          <a:prstGeom prst="rect">
+            <a:avLst/>
+          </a:prstGeom>
+          <a:noFill/>
+        </p:spPr>
+        <p:txBody>
+          <a:bodyPr wrap="none" rtlCol="0">
+            <a:spAutoFit/>
+          </a:bodyPr>
+          <a:p>
+            <a:pPr algn="ctr"/>
+            <a:r>
+              <a:rPr lang="en-MY" altLang="en-US"/>
+              <a:t>This ties into our main meaty topic...</a:t>
+            </a:r>
+            <a:endParaRPr lang="en-MY" altLang="en-US"/>
           </a:p>
         </p:txBody>
       </p:sp>
@@ -3058,8 +3555,8 @@
         </p:nvSpPr>
         <p:spPr>
           <a:xfrm>
-            <a:off x="508000" y="345440"/>
-            <a:ext cx="6604635" cy="829310"/>
+            <a:off x="495300" y="333375"/>
+            <a:ext cx="6755765" cy="829310"/>
           </a:xfrm>
           <a:prstGeom prst="rect">
             <a:avLst/>
@@ -3073,12 +3570,164 @@
           <a:p>
             <a:r>
               <a:rPr lang="en-MY" altLang="en-US" sz="4800"/>
-              <a:t>Abstract - Dealing in Ideas</a:t>
+              <a:t>Polymorphism and Casting</a:t>
             </a:r>
             <a:endParaRPr lang="en-MY" altLang="en-US" sz="4800"/>
           </a:p>
         </p:txBody>
       </p:sp>
+      <p:sp>
+        <p:nvSpPr>
+          <p:cNvPr id="3" name="Text Box 2"/>
+          <p:cNvSpPr txBox="1"/>
+          <p:nvPr/>
+        </p:nvSpPr>
+        <p:spPr>
+          <a:xfrm>
+            <a:off x="1467485" y="1256030"/>
+            <a:ext cx="6208395" cy="916940"/>
+          </a:xfrm>
+          <a:prstGeom prst="rect">
+            <a:avLst/>
+          </a:prstGeom>
+          <a:noFill/>
+        </p:spPr>
+        <p:txBody>
+          <a:bodyPr wrap="square" rtlCol="0">
+            <a:spAutoFit/>
+          </a:bodyPr>
+          <a:p>
+            <a:pPr algn="ctr"/>
+            <a:r>
+              <a:rPr lang="en-MY" altLang="en-US"/>
+              <a:t>We touched on this briefly last week - the idea that something can be considered something else. Let's look at Birdie and Animal again...</a:t>
+            </a:r>
+            <a:endParaRPr lang="en-MY" altLang="en-US"/>
+          </a:p>
+        </p:txBody>
+      </p:sp>
+      <p:sp>
+        <p:nvSpPr>
+          <p:cNvPr id="4" name="Text Box 3"/>
+          <p:cNvSpPr txBox="1"/>
+          <p:nvPr/>
+        </p:nvSpPr>
+        <p:spPr>
+          <a:xfrm>
+            <a:off x="1098233" y="5525770"/>
+            <a:ext cx="6947535" cy="916940"/>
+          </a:xfrm>
+          <a:prstGeom prst="rect">
+            <a:avLst/>
+          </a:prstGeom>
+          <a:noFill/>
+        </p:spPr>
+        <p:txBody>
+          <a:bodyPr wrap="none" rtlCol="0">
+            <a:spAutoFit/>
+          </a:bodyPr>
+          <a:p>
+            <a:pPr algn="ctr"/>
+            <a:r>
+              <a:rPr lang="en-MY" altLang="en-US"/>
+              <a:t>Really, these three pictures tell you all you need to know, but just in case:</a:t>
+            </a:r>
+            <a:endParaRPr lang="en-MY" altLang="en-US"/>
+          </a:p>
+          <a:p>
+            <a:pPr algn="ctr"/>
+            <a:r>
+              <a:rPr lang="en-MY" altLang="en-US"/>
+              <a:t>Birdie is a child of Animal, </a:t>
+            </a:r>
+            <a:r>
+              <a:rPr lang="en-MY" altLang="en-US" i="1"/>
+              <a:t>and can be considered an Animal class.</a:t>
+            </a:r>
+            <a:endParaRPr lang="en-MY" altLang="en-US"/>
+          </a:p>
+          <a:p>
+            <a:pPr algn="ctr"/>
+            <a:r>
+              <a:rPr lang="en-MY" altLang="en-US"/>
+              <a:t>Therefore, when in the identify method, both cases pass through.</a:t>
+            </a:r>
+            <a:endParaRPr lang="en-MY" altLang="en-US"/>
+          </a:p>
+        </p:txBody>
+      </p:sp>
+      <p:pic>
+        <p:nvPicPr>
+          <p:cNvPr id="5" name="Picture 4" descr="Capture2"/>
+          <p:cNvPicPr>
+            <a:picLocks noChangeAspect="1"/>
+          </p:cNvPicPr>
+          <p:nvPr/>
+        </p:nvPicPr>
+        <p:blipFill>
+          <a:blip r:embed="rId1"/>
+          <a:stretch>
+            <a:fillRect/>
+          </a:stretch>
+        </p:blipFill>
+        <p:spPr>
+          <a:xfrm>
+            <a:off x="3057525" y="2266315"/>
+            <a:ext cx="3028315" cy="1294765"/>
+          </a:xfrm>
+          <a:prstGeom prst="rect">
+            <a:avLst/>
+          </a:prstGeom>
+        </p:spPr>
+      </p:pic>
+      <p:pic>
+        <p:nvPicPr>
+          <p:cNvPr id="6" name="Picture 5" descr="Capture"/>
+          <p:cNvPicPr>
+            <a:picLocks noChangeAspect="1"/>
+          </p:cNvPicPr>
+          <p:nvPr/>
+        </p:nvPicPr>
+        <p:blipFill>
+          <a:blip r:embed="rId2"/>
+          <a:stretch>
+            <a:fillRect/>
+          </a:stretch>
+        </p:blipFill>
+        <p:spPr>
+          <a:xfrm>
+            <a:off x="939800" y="3561080"/>
+            <a:ext cx="6983095" cy="1019175"/>
+          </a:xfrm>
+          <a:prstGeom prst="rect">
+            <a:avLst/>
+          </a:prstGeom>
+        </p:spPr>
+      </p:pic>
+      <p:pic>
+        <p:nvPicPr>
+          <p:cNvPr id="8" name="Picture 7" descr="Capture"/>
+          <p:cNvPicPr>
+            <a:picLocks noChangeAspect="1"/>
+          </p:cNvPicPr>
+          <p:nvPr/>
+        </p:nvPicPr>
+        <p:blipFill>
+          <a:blip r:embed="rId3"/>
+          <a:stretch>
+            <a:fillRect/>
+          </a:stretch>
+        </p:blipFill>
+        <p:spPr>
+          <a:xfrm>
+            <a:off x="627380" y="4664710"/>
+            <a:ext cx="7890510" cy="561975"/>
+          </a:xfrm>
+          <a:prstGeom prst="rect">
+            <a:avLst/>
+          </a:prstGeom>
+        </p:spPr>
+      </p:pic>
     </p:spTree>
   </p:cSld>
   <p:clrMapOvr>
@@ -3097,60 +3746,79 @@
         <p:nvPr/>
       </p:nvGrpSpPr>
       <p:grpSpPr/>
-    </p:spTree>
-  </p:cSld>
-  <p:clrMapOvr>
-    <a:masterClrMapping/>
-  </p:clrMapOvr>
-</p:sld>
-</file>
-
-<file path=ppt/slides/slide7.xml><?xml version="1.0" encoding="utf-8"?>
-<p:sld xmlns:a="http://schemas.openxmlformats.org/drawingml/2006/main" xmlns:r="http://schemas.openxmlformats.org/officeDocument/2006/relationships" xmlns:p="http://schemas.openxmlformats.org/presentationml/2006/main">
-  <p:cSld>
-    <p:spTree>
-      <p:nvGrpSpPr>
-        <p:cNvPr id="1" name=""/>
-        <p:cNvGrpSpPr/>
-        <p:nvPr/>
-      </p:nvGrpSpPr>
-      <p:grpSpPr/>
-    </p:spTree>
-  </p:cSld>
-  <p:clrMapOvr>
-    <a:masterClrMapping/>
-  </p:clrMapOvr>
-</p:sld>
-</file>
-
-<file path=ppt/slides/slide8.xml><?xml version="1.0" encoding="utf-8"?>
-<p:sld xmlns:a="http://schemas.openxmlformats.org/drawingml/2006/main" xmlns:r="http://schemas.openxmlformats.org/officeDocument/2006/relationships" xmlns:p="http://schemas.openxmlformats.org/presentationml/2006/main">
-  <p:cSld>
-    <p:spTree>
-      <p:nvGrpSpPr>
-        <p:cNvPr id="1" name=""/>
-        <p:cNvGrpSpPr/>
-        <p:nvPr/>
-      </p:nvGrpSpPr>
-      <p:grpSpPr/>
-    </p:spTree>
-  </p:cSld>
-  <p:clrMapOvr>
-    <a:masterClrMapping/>
-  </p:clrMapOvr>
-</p:sld>
-</file>
-
-<file path=ppt/slides/slide9.xml><?xml version="1.0" encoding="utf-8"?>
-<p:sld xmlns:a="http://schemas.openxmlformats.org/drawingml/2006/main" xmlns:r="http://schemas.openxmlformats.org/officeDocument/2006/relationships" xmlns:p="http://schemas.openxmlformats.org/presentationml/2006/main">
-  <p:cSld>
-    <p:spTree>
-      <p:nvGrpSpPr>
-        <p:cNvPr id="1" name=""/>
-        <p:cNvGrpSpPr/>
-        <p:nvPr/>
-      </p:nvGrpSpPr>
-      <p:grpSpPr/>
+      <p:sp>
+        <p:nvSpPr>
+          <p:cNvPr id="2" name="Text Box 1"/>
+          <p:cNvSpPr txBox="1"/>
+          <p:nvPr/>
+        </p:nvSpPr>
+        <p:spPr>
+          <a:xfrm>
+            <a:off x="495300" y="333375"/>
+            <a:ext cx="6755765" cy="829310"/>
+          </a:xfrm>
+          <a:prstGeom prst="rect">
+            <a:avLst/>
+          </a:prstGeom>
+          <a:noFill/>
+        </p:spPr>
+        <p:txBody>
+          <a:bodyPr wrap="none" rtlCol="0">
+            <a:spAutoFit/>
+          </a:bodyPr>
+          <a:p>
+            <a:r>
+              <a:rPr lang="en-MY" altLang="en-US" sz="4800"/>
+              <a:t>Polymorphism and Casting</a:t>
+            </a:r>
+            <a:endParaRPr lang="en-MY" altLang="en-US" sz="4800"/>
+          </a:p>
+        </p:txBody>
+      </p:sp>
+      <p:sp>
+        <p:nvSpPr>
+          <p:cNvPr id="3" name="Text Box 2"/>
+          <p:cNvSpPr txBox="1"/>
+          <p:nvPr/>
+        </p:nvSpPr>
+        <p:spPr>
+          <a:xfrm>
+            <a:off x="1264920" y="1293495"/>
+            <a:ext cx="6614795" cy="642620"/>
+          </a:xfrm>
+          <a:prstGeom prst="rect">
+            <a:avLst/>
+          </a:prstGeom>
+          <a:noFill/>
+        </p:spPr>
+        <p:txBody>
+          <a:bodyPr wrap="square" rtlCol="0">
+            <a:spAutoFit/>
+          </a:bodyPr>
+          <a:p>
+            <a:pPr algn="ctr"/>
+            <a:r>
+              <a:rPr lang="en-MY" altLang="en-US"/>
+              <a:t>You may have noticed the word </a:t>
+            </a:r>
+            <a:r>
+              <a:rPr lang="en-MY" altLang="en-US">
+                <a:latin typeface="Lucida Console" panose="020B0609040504020204" charset="0"/>
+              </a:rPr>
+              <a:t>instanceof</a:t>
+            </a:r>
+            <a:r>
+              <a:rPr lang="en-MY" altLang="en-US">
+                <a:latin typeface="Calibri" panose="020F0502020204030204" charset="0"/>
+              </a:rPr>
+              <a:t> in there, but before we can talk about that, we have to talk about casting.</a:t>
+            </a:r>
+            <a:endParaRPr lang="en-MY" altLang="en-US">
+              <a:latin typeface="Calibri" panose="020F0502020204030204" charset="0"/>
+            </a:endParaRPr>
+          </a:p>
+        </p:txBody>
+      </p:sp>
     </p:spTree>
   </p:cSld>
   <p:clrMapOvr>

</xml_diff>

<commit_message>
[Presentation] Final Form for 30th Nov 2016
Signed-off-by: Brandon Teoh <Brandon Teoh>
</commit_message>
<xml_diff>
--- a/Java_Class_30th_Nov.pptx
+++ b/Java_Class_30th_Nov.pptx
@@ -4,13 +4,17 @@
   <p:sldMasterIdLst>
     <p:sldMasterId id="2147483648" r:id="rId1"/>
   </p:sldMasterIdLst>
+  <p:notesMasterIdLst>
+    <p:notesMasterId r:id="rId8"/>
+  </p:notesMasterIdLst>
   <p:sldIdLst>
     <p:sldId id="262" r:id="rId3"/>
     <p:sldId id="263" r:id="rId4"/>
     <p:sldId id="264" r:id="rId5"/>
     <p:sldId id="265" r:id="rId6"/>
     <p:sldId id="266" r:id="rId7"/>
-    <p:sldId id="273" r:id="rId8"/>
+    <p:sldId id="273" r:id="rId9"/>
+    <p:sldId id="274" r:id="rId10"/>
   </p:sldIdLst>
   <p:sldSz cx="9144000" cy="6858000" type="screen4x3"/>
   <p:notesSz cx="7103745" cy="10234295"/>
@@ -110,6 +114,397 @@
     </a:lvl9pPr>
   </p:defaultTextStyle>
 </p:presentation>
+</file>
+
+<file path=ppt/notesMasters/notesMaster1.xml><?xml version="1.0" encoding="utf-8"?>
+<p:notesMaster xmlns:a="http://schemas.openxmlformats.org/drawingml/2006/main" xmlns:r="http://schemas.openxmlformats.org/officeDocument/2006/relationships" xmlns:p="http://schemas.openxmlformats.org/presentationml/2006/main">
+  <p:cSld>
+    <p:bg>
+      <p:bgRef idx="1001">
+        <a:schemeClr val="bg1"/>
+      </p:bgRef>
+    </p:bg>
+    <p:spTree>
+      <p:nvGrpSpPr>
+        <p:cNvPr id="1" name=""/>
+        <p:cNvGrpSpPr/>
+        <p:nvPr/>
+      </p:nvGrpSpPr>
+      <p:grpSpPr>
+        <a:xfrm>
+          <a:off x="0" y="0"/>
+          <a:ext cx="0" cy="0"/>
+          <a:chOff x="0" y="0"/>
+          <a:chExt cx="0" cy="0"/>
+        </a:xfrm>
+      </p:grpSpPr>
+      <p:sp>
+        <p:nvSpPr>
+          <p:cNvPr id="2" name="Header Placeholder 1"/>
+          <p:cNvSpPr>
+            <a:spLocks noGrp="1"/>
+          </p:cNvSpPr>
+          <p:nvPr>
+            <p:ph type="hdr" sz="quarter"/>
+          </p:nvPr>
+        </p:nvSpPr>
+        <p:spPr>
+          <a:xfrm>
+            <a:off x="0" y="0"/>
+            <a:ext cx="3078290" cy="513492"/>
+          </a:xfrm>
+          <a:prstGeom prst="rect">
+            <a:avLst/>
+          </a:prstGeom>
+        </p:spPr>
+        <p:txBody>
+          <a:bodyPr vert="horz" lIns="91440" tIns="45720" rIns="91440" bIns="45720" rtlCol="0"/>
+          <a:lstStyle>
+            <a:lvl1pPr algn="l">
+              <a:defRPr sz="1200"/>
+            </a:lvl1pPr>
+          </a:lstStyle>
+          <a:p>
+            <a:endParaRPr lang="en-US"/>
+          </a:p>
+        </p:txBody>
+      </p:sp>
+      <p:sp>
+        <p:nvSpPr>
+          <p:cNvPr id="3" name="Date Placeholder 2"/>
+          <p:cNvSpPr>
+            <a:spLocks noGrp="1"/>
+          </p:cNvSpPr>
+          <p:nvPr>
+            <p:ph type="dt" idx="1"/>
+          </p:nvPr>
+        </p:nvSpPr>
+        <p:spPr>
+          <a:xfrm>
+            <a:off x="4023812" y="0"/>
+            <a:ext cx="3078290" cy="513492"/>
+          </a:xfrm>
+          <a:prstGeom prst="rect">
+            <a:avLst/>
+          </a:prstGeom>
+        </p:spPr>
+        <p:txBody>
+          <a:bodyPr vert="horz" lIns="91440" tIns="45720" rIns="91440" bIns="45720" rtlCol="0"/>
+          <a:lstStyle>
+            <a:lvl1pPr algn="r">
+              <a:defRPr sz="1200"/>
+            </a:lvl1pPr>
+          </a:lstStyle>
+          <a:p>
+            <a:fld id="{3EFD42F7-718C-4B98-AAEC-167E6DDD60A7}" type="datetimeFigureOut">
+              <a:rPr lang="en-US" smtClean="0"/>
+            </a:fld>
+            <a:endParaRPr lang="en-US"/>
+          </a:p>
+        </p:txBody>
+      </p:sp>
+      <p:sp>
+        <p:nvSpPr>
+          <p:cNvPr id="4" name="Slide Image Placeholder 3"/>
+          <p:cNvSpPr>
+            <a:spLocks noGrp="1" noRot="1" noChangeAspect="1"/>
+          </p:cNvSpPr>
+          <p:nvPr>
+            <p:ph type="sldImg" idx="2"/>
+          </p:nvPr>
+        </p:nvSpPr>
+        <p:spPr>
+          <a:xfrm>
+            <a:off x="481584" y="1279287"/>
+            <a:ext cx="6140577" cy="3454075"/>
+          </a:xfrm>
+          <a:prstGeom prst="rect">
+            <a:avLst/>
+          </a:prstGeom>
+          <a:noFill/>
+          <a:ln w="12700">
+            <a:solidFill>
+              <a:prstClr val="black"/>
+            </a:solidFill>
+          </a:ln>
+        </p:spPr>
+        <p:txBody>
+          <a:bodyPr vert="horz" lIns="91440" tIns="45720" rIns="91440" bIns="45720" rtlCol="0" anchor="ctr"/>
+          <a:lstStyle/>
+          <a:p>
+            <a:endParaRPr lang="en-US"/>
+          </a:p>
+        </p:txBody>
+      </p:sp>
+      <p:sp>
+        <p:nvSpPr>
+          <p:cNvPr id="5" name="Notes Placeholder 4"/>
+          <p:cNvSpPr>
+            <a:spLocks noGrp="1"/>
+          </p:cNvSpPr>
+          <p:nvPr>
+            <p:ph type="body" sz="quarter" idx="3"/>
+          </p:nvPr>
+        </p:nvSpPr>
+        <p:spPr>
+          <a:xfrm>
+            <a:off x="710375" y="4925254"/>
+            <a:ext cx="5682996" cy="4029754"/>
+          </a:xfrm>
+          <a:prstGeom prst="rect">
+            <a:avLst/>
+          </a:prstGeom>
+        </p:spPr>
+        <p:txBody>
+          <a:bodyPr vert="horz" lIns="91440" tIns="45720" rIns="91440" bIns="45720" rtlCol="0"/>
+          <a:lstStyle/>
+          <a:p>
+            <a:pPr lvl="0"/>
+            <a:r>
+              <a:rPr lang="en-US" smtClean="0"/>
+              <a:t>Click to edit Master text styles</a:t>
+            </a:r>
+            <a:endParaRPr lang="en-US" smtClean="0"/>
+          </a:p>
+          <a:p>
+            <a:pPr lvl="1"/>
+            <a:r>
+              <a:rPr lang="en-US" smtClean="0"/>
+              <a:t>Second level</a:t>
+            </a:r>
+            <a:endParaRPr lang="en-US" smtClean="0"/>
+          </a:p>
+          <a:p>
+            <a:pPr lvl="2"/>
+            <a:r>
+              <a:rPr lang="en-US" smtClean="0"/>
+              <a:t>Third level</a:t>
+            </a:r>
+            <a:endParaRPr lang="en-US" smtClean="0"/>
+          </a:p>
+          <a:p>
+            <a:pPr lvl="3"/>
+            <a:r>
+              <a:rPr lang="en-US" smtClean="0"/>
+              <a:t>Fourth level</a:t>
+            </a:r>
+            <a:endParaRPr lang="en-US" smtClean="0"/>
+          </a:p>
+          <a:p>
+            <a:pPr lvl="4"/>
+            <a:r>
+              <a:rPr lang="en-US" smtClean="0"/>
+              <a:t>Fifth level</a:t>
+            </a:r>
+            <a:endParaRPr lang="en-US"/>
+          </a:p>
+        </p:txBody>
+      </p:sp>
+      <p:sp>
+        <p:nvSpPr>
+          <p:cNvPr id="6" name="Footer Placeholder 5"/>
+          <p:cNvSpPr>
+            <a:spLocks noGrp="1"/>
+          </p:cNvSpPr>
+          <p:nvPr>
+            <p:ph type="ftr" sz="quarter" idx="4"/>
+          </p:nvPr>
+        </p:nvSpPr>
+        <p:spPr>
+          <a:xfrm>
+            <a:off x="0" y="9720804"/>
+            <a:ext cx="3078290" cy="513491"/>
+          </a:xfrm>
+          <a:prstGeom prst="rect">
+            <a:avLst/>
+          </a:prstGeom>
+        </p:spPr>
+        <p:txBody>
+          <a:bodyPr vert="horz" lIns="91440" tIns="45720" rIns="91440" bIns="45720" rtlCol="0" anchor="b"/>
+          <a:lstStyle>
+            <a:lvl1pPr algn="l">
+              <a:defRPr sz="1200"/>
+            </a:lvl1pPr>
+          </a:lstStyle>
+          <a:p>
+            <a:endParaRPr lang="en-US"/>
+          </a:p>
+        </p:txBody>
+      </p:sp>
+      <p:sp>
+        <p:nvSpPr>
+          <p:cNvPr id="7" name="Slide Number Placeholder 6"/>
+          <p:cNvSpPr>
+            <a:spLocks noGrp="1"/>
+          </p:cNvSpPr>
+          <p:nvPr>
+            <p:ph type="sldNum" sz="quarter" idx="5"/>
+          </p:nvPr>
+        </p:nvSpPr>
+        <p:spPr>
+          <a:xfrm>
+            <a:off x="4023812" y="9720804"/>
+            <a:ext cx="3078290" cy="513491"/>
+          </a:xfrm>
+          <a:prstGeom prst="rect">
+            <a:avLst/>
+          </a:prstGeom>
+        </p:spPr>
+        <p:txBody>
+          <a:bodyPr vert="horz" lIns="91440" tIns="45720" rIns="91440" bIns="45720" rtlCol="0" anchor="b"/>
+          <a:lstStyle>
+            <a:lvl1pPr algn="r">
+              <a:defRPr sz="1200"/>
+            </a:lvl1pPr>
+          </a:lstStyle>
+          <a:p>
+            <a:fld id="{21B2AA4F-B828-4D7C-AFD3-893933DAFCB4}" type="slidenum">
+              <a:rPr lang="en-US" smtClean="0"/>
+            </a:fld>
+            <a:endParaRPr lang="en-US"/>
+          </a:p>
+        </p:txBody>
+      </p:sp>
+    </p:spTree>
+  </p:cSld>
+  <p:clrMap bg1="lt1" tx1="dk1" bg2="lt2" tx2="dk2" accent1="accent1" accent2="accent2" accent3="accent3" accent4="accent4" accent5="accent5" accent6="accent6" hlink="hlink" folHlink="folHlink"/>
+  <p:notesStyle>
+    <a:lvl1pPr marL="0" algn="l" defTabSz="914400" rtl="0" eaLnBrk="1" latinLnBrk="0" hangingPunct="1">
+      <a:defRPr sz="1200" kern="1200">
+        <a:solidFill>
+          <a:schemeClr val="tx1"/>
+        </a:solidFill>
+        <a:latin typeface="+mn-lt"/>
+        <a:ea typeface="+mn-ea"/>
+        <a:cs typeface="+mn-cs"/>
+      </a:defRPr>
+    </a:lvl1pPr>
+    <a:lvl2pPr marL="457200" algn="l" defTabSz="914400" rtl="0" eaLnBrk="1" latinLnBrk="0" hangingPunct="1">
+      <a:defRPr sz="1200" kern="1200">
+        <a:solidFill>
+          <a:schemeClr val="tx1"/>
+        </a:solidFill>
+        <a:latin typeface="+mn-lt"/>
+        <a:ea typeface="+mn-ea"/>
+        <a:cs typeface="+mn-cs"/>
+      </a:defRPr>
+    </a:lvl2pPr>
+    <a:lvl3pPr marL="914400" algn="l" defTabSz="914400" rtl="0" eaLnBrk="1" latinLnBrk="0" hangingPunct="1">
+      <a:defRPr sz="1200" kern="1200">
+        <a:solidFill>
+          <a:schemeClr val="tx1"/>
+        </a:solidFill>
+        <a:latin typeface="+mn-lt"/>
+        <a:ea typeface="+mn-ea"/>
+        <a:cs typeface="+mn-cs"/>
+      </a:defRPr>
+    </a:lvl3pPr>
+    <a:lvl4pPr marL="1371600" algn="l" defTabSz="914400" rtl="0" eaLnBrk="1" latinLnBrk="0" hangingPunct="1">
+      <a:defRPr sz="1200" kern="1200">
+        <a:solidFill>
+          <a:schemeClr val="tx1"/>
+        </a:solidFill>
+        <a:latin typeface="+mn-lt"/>
+        <a:ea typeface="+mn-ea"/>
+        <a:cs typeface="+mn-cs"/>
+      </a:defRPr>
+    </a:lvl4pPr>
+    <a:lvl5pPr marL="1828800" algn="l" defTabSz="914400" rtl="0" eaLnBrk="1" latinLnBrk="0" hangingPunct="1">
+      <a:defRPr sz="1200" kern="1200">
+        <a:solidFill>
+          <a:schemeClr val="tx1"/>
+        </a:solidFill>
+        <a:latin typeface="+mn-lt"/>
+        <a:ea typeface="+mn-ea"/>
+        <a:cs typeface="+mn-cs"/>
+      </a:defRPr>
+    </a:lvl5pPr>
+    <a:lvl6pPr marL="2286000" algn="l" defTabSz="914400" rtl="0" eaLnBrk="1" latinLnBrk="0" hangingPunct="1">
+      <a:defRPr sz="1200" kern="1200">
+        <a:solidFill>
+          <a:schemeClr val="tx1"/>
+        </a:solidFill>
+        <a:latin typeface="+mn-lt"/>
+        <a:ea typeface="+mn-ea"/>
+        <a:cs typeface="+mn-cs"/>
+      </a:defRPr>
+    </a:lvl6pPr>
+    <a:lvl7pPr marL="2743200" algn="l" defTabSz="914400" rtl="0" eaLnBrk="1" latinLnBrk="0" hangingPunct="1">
+      <a:defRPr sz="1200" kern="1200">
+        <a:solidFill>
+          <a:schemeClr val="tx1"/>
+        </a:solidFill>
+        <a:latin typeface="+mn-lt"/>
+        <a:ea typeface="+mn-ea"/>
+        <a:cs typeface="+mn-cs"/>
+      </a:defRPr>
+    </a:lvl7pPr>
+    <a:lvl8pPr marL="3200400" algn="l" defTabSz="914400" rtl="0" eaLnBrk="1" latinLnBrk="0" hangingPunct="1">
+      <a:defRPr sz="1200" kern="1200">
+        <a:solidFill>
+          <a:schemeClr val="tx1"/>
+        </a:solidFill>
+        <a:latin typeface="+mn-lt"/>
+        <a:ea typeface="+mn-ea"/>
+        <a:cs typeface="+mn-cs"/>
+      </a:defRPr>
+    </a:lvl8pPr>
+    <a:lvl9pPr marL="3657600" algn="l" defTabSz="914400" rtl="0" eaLnBrk="1" latinLnBrk="0" hangingPunct="1">
+      <a:defRPr sz="1200" kern="1200">
+        <a:solidFill>
+          <a:schemeClr val="tx1"/>
+        </a:solidFill>
+        <a:latin typeface="+mn-lt"/>
+        <a:ea typeface="+mn-ea"/>
+        <a:cs typeface="+mn-cs"/>
+      </a:defRPr>
+    </a:lvl9pPr>
+  </p:notesStyle>
+</p:notesMaster>
+</file>
+
+<file path=ppt/notesSlides/notesSlide1.xml><?xml version="1.0" encoding="utf-8"?>
+<p:notes xmlns:a="http://schemas.openxmlformats.org/drawingml/2006/main" xmlns:r="http://schemas.openxmlformats.org/officeDocument/2006/relationships" xmlns:p="http://schemas.openxmlformats.org/presentationml/2006/main">
+  <p:cSld>
+    <p:spTree>
+      <p:nvGrpSpPr>
+        <p:cNvPr id="1" name=""/>
+        <p:cNvGrpSpPr/>
+        <p:nvPr/>
+      </p:nvGrpSpPr>
+      <p:grpSpPr/>
+      <p:sp>
+        <p:nvSpPr>
+          <p:cNvPr id="2" name="Slide Image Placeholder 1"/>
+          <p:cNvSpPr/>
+          <p:nvPr>
+            <p:ph type="sldImg" idx="2"/>
+          </p:nvPr>
+        </p:nvSpPr>
+        <p:spPr/>
+      </p:sp>
+      <p:sp>
+        <p:nvSpPr>
+          <p:cNvPr id="3" name="Text Placeholder 2"/>
+          <p:cNvSpPr/>
+          <p:nvPr>
+            <p:ph type="body" idx="3"/>
+          </p:nvPr>
+        </p:nvSpPr>
+        <p:spPr/>
+        <p:txBody>
+          <a:bodyPr/>
+          <a:p>
+            <a:endParaRPr lang="en-US"/>
+          </a:p>
+        </p:txBody>
+      </p:sp>
+    </p:spTree>
+  </p:cSld>
+  <p:clrMapOvr>
+    <a:masterClrMapping/>
+  </p:clrMapOvr>
+</p:notes>
 </file>
 
 <file path=ppt/slideLayouts/slideLayout1.xml><?xml version="1.0" encoding="utf-8"?>
@@ -2640,8 +3035,8 @@
         </p:nvSpPr>
         <p:spPr>
           <a:xfrm>
-            <a:off x="977265" y="1431290"/>
-            <a:ext cx="7134225" cy="3757295"/>
+            <a:off x="964565" y="3108960"/>
+            <a:ext cx="7134225" cy="1014095"/>
           </a:xfrm>
           <a:prstGeom prst="rect">
             <a:avLst/>
@@ -2657,21 +3052,6 @@
             <a:r>
               <a:rPr lang="en-MY" altLang="en-US" sz="6000"/>
               <a:t>Hi. </a:t>
-            </a:r>
-            <a:endParaRPr lang="en-MY" altLang="en-US" sz="6000"/>
-          </a:p>
-          <a:p>
-            <a:pPr algn="ctr"/>
-            <a:r>
-              <a:rPr lang="en-MY" altLang="en-US" sz="6000"/>
-              <a:t>I have only 6 slides for you today.</a:t>
-            </a:r>
-            <a:br>
-              <a:rPr lang="en-MY" altLang="en-US" sz="6000"/>
-            </a:br>
-            <a:r>
-              <a:rPr lang="en-MY" altLang="en-US" sz="6000"/>
-              <a:t>Good luck.</a:t>
             </a:r>
             <a:endParaRPr lang="en-MY" altLang="en-US" sz="6000"/>
           </a:p>
@@ -3728,6 +4108,62 @@
           </a:prstGeom>
         </p:spPr>
       </p:pic>
+      <p:sp>
+        <p:nvSpPr>
+          <p:cNvPr id="7" name="Text Box 6"/>
+          <p:cNvSpPr txBox="1"/>
+          <p:nvPr/>
+        </p:nvSpPr>
+        <p:spPr>
+          <a:xfrm flipH="1">
+            <a:off x="50800" y="6553835"/>
+            <a:ext cx="9044305" cy="245110"/>
+          </a:xfrm>
+          <a:prstGeom prst="rect">
+            <a:avLst/>
+          </a:prstGeom>
+          <a:noFill/>
+        </p:spPr>
+        <p:txBody>
+          <a:bodyPr wrap="square" rtlCol="0">
+            <a:spAutoFit/>
+          </a:bodyPr>
+          <a:p>
+            <a:pPr algn="ctr"/>
+            <a:r>
+              <a:rPr lang="en-MY" altLang="en-US" sz="1000"/>
+              <a:t>You may have noticed the word </a:t>
+            </a:r>
+            <a:r>
+              <a:rPr lang="en-MY" altLang="en-US" sz="1000">
+                <a:latin typeface="Lucida Console" panose="020B0609040504020204" charset="0"/>
+              </a:rPr>
+              <a:t>instanceof</a:t>
+            </a:r>
+            <a:r>
+              <a:rPr lang="en-MY" altLang="en-US" sz="1000">
+                <a:latin typeface="Calibri" panose="020F0502020204030204" charset="0"/>
+              </a:rPr>
+              <a:t> in there as well, if the LHS class is part of the family tree of the RHS argument of </a:t>
+            </a:r>
+            <a:r>
+              <a:rPr lang="en-MY" altLang="en-US" sz="1000">
+                <a:latin typeface="Lucida Console" panose="020B0609040504020204" charset="0"/>
+              </a:rPr>
+              <a:t>instanceof</a:t>
+            </a:r>
+            <a:r>
+              <a:rPr lang="en-MY" altLang="en-US" sz="1000">
+                <a:latin typeface="Calibri" panose="020F0502020204030204" charset="0"/>
+              </a:rPr>
+              <a:t>, then it returns true.</a:t>
+            </a:r>
+            <a:endParaRPr lang="en-MY" altLang="en-US" sz="1000">
+              <a:latin typeface="Calibri" panose="020F0502020204030204" charset="0"/>
+            </a:endParaRPr>
+          </a:p>
+        </p:txBody>
+      </p:sp>
     </p:spTree>
   </p:cSld>
   <p:clrMapOvr>
@@ -3777,14 +4213,14 @@
       </p:sp>
       <p:sp>
         <p:nvSpPr>
-          <p:cNvPr id="3" name="Text Box 2"/>
+          <p:cNvPr id="7" name="Text Box 6"/>
           <p:cNvSpPr txBox="1"/>
           <p:nvPr/>
         </p:nvSpPr>
         <p:spPr>
           <a:xfrm>
-            <a:off x="1264920" y="1293495"/>
-            <a:ext cx="6614795" cy="642620"/>
+            <a:off x="1499870" y="1503680"/>
+            <a:ext cx="3985260" cy="916940"/>
           </a:xfrm>
           <a:prstGeom prst="rect">
             <a:avLst/>
@@ -3799,23 +4235,180 @@
             <a:pPr algn="ctr"/>
             <a:r>
               <a:rPr lang="en-MY" altLang="en-US"/>
-              <a:t>You may have noticed the word </a:t>
-            </a:r>
-            <a:r>
-              <a:rPr lang="en-MY" altLang="en-US">
-                <a:latin typeface="Lucida Console" panose="020B0609040504020204" charset="0"/>
-              </a:rPr>
-              <a:t>instanceof</a:t>
-            </a:r>
-            <a:r>
-              <a:rPr lang="en-MY" altLang="en-US">
-                <a:latin typeface="Calibri" panose="020F0502020204030204" charset="0"/>
-              </a:rPr>
-              <a:t> in there, but before we can talk about that, we have to talk about casting.</a:t>
-            </a:r>
-            <a:endParaRPr lang="en-MY" altLang="en-US">
-              <a:latin typeface="Calibri" panose="020F0502020204030204" charset="0"/>
-            </a:endParaRPr>
+              <a:t>Let's talk about casting. If you've played </a:t>
+            </a:r>
+            <a:r>
+              <a:rPr lang="en-MY" altLang="en-US" i="1"/>
+              <a:t>Runescape</a:t>
+            </a:r>
+            <a:r>
+              <a:rPr lang="en-MY" altLang="en-US"/>
+              <a:t> at any point in your life, you may have come across moulds.</a:t>
+            </a:r>
+            <a:endParaRPr lang="en-MY" altLang="en-US"/>
+          </a:p>
+        </p:txBody>
+      </p:sp>
+      <p:pic>
+        <p:nvPicPr>
+          <p:cNvPr id="9" name="Picture 8" descr="Holy_mould"/>
+          <p:cNvPicPr>
+            <a:picLocks noChangeAspect="1"/>
+          </p:cNvPicPr>
+          <p:nvPr/>
+        </p:nvPicPr>
+        <p:blipFill>
+          <a:blip r:embed="rId1"/>
+          <a:stretch>
+            <a:fillRect/>
+          </a:stretch>
+        </p:blipFill>
+        <p:spPr>
+          <a:xfrm>
+            <a:off x="5868670" y="1294130"/>
+            <a:ext cx="1382395" cy="1336040"/>
+          </a:xfrm>
+          <a:prstGeom prst="rect">
+            <a:avLst/>
+          </a:prstGeom>
+        </p:spPr>
+      </p:pic>
+      <p:sp>
+        <p:nvSpPr>
+          <p:cNvPr id="10" name="Text Box 9"/>
+          <p:cNvSpPr txBox="1"/>
+          <p:nvPr/>
+        </p:nvSpPr>
+        <p:spPr>
+          <a:xfrm>
+            <a:off x="1617345" y="2970530"/>
+            <a:ext cx="5909945" cy="916940"/>
+          </a:xfrm>
+          <a:prstGeom prst="rect">
+            <a:avLst/>
+          </a:prstGeom>
+          <a:noFill/>
+        </p:spPr>
+        <p:txBody>
+          <a:bodyPr wrap="square" rtlCol="0">
+            <a:spAutoFit/>
+          </a:bodyPr>
+          <a:p>
+            <a:pPr algn="ctr"/>
+            <a:r>
+              <a:rPr lang="en-MY" altLang="en-US"/>
+              <a:t>Bars of silver are a key component in making holy symbols, but to do that you need a holy mould. Once you pour molten silver into the mould - or </a:t>
+            </a:r>
+            <a:r>
+              <a:rPr lang="en-MY" altLang="en-US" i="1"/>
+              <a:t>cast </a:t>
+            </a:r>
+            <a:r>
+              <a:rPr lang="en-MY" altLang="en-US"/>
+              <a:t>- it becomes a holy symbol.</a:t>
+            </a:r>
+            <a:endParaRPr lang="en-MY" altLang="en-US"/>
+          </a:p>
+        </p:txBody>
+      </p:sp>
+      <p:pic>
+        <p:nvPicPr>
+          <p:cNvPr id="11" name="Picture 10" descr="Capture"/>
+          <p:cNvPicPr>
+            <a:picLocks noChangeAspect="1"/>
+          </p:cNvPicPr>
+          <p:nvPr/>
+        </p:nvPicPr>
+        <p:blipFill>
+          <a:blip r:embed="rId2"/>
+          <a:stretch>
+            <a:fillRect/>
+          </a:stretch>
+        </p:blipFill>
+        <p:spPr>
+          <a:xfrm>
+            <a:off x="1497965" y="4091940"/>
+            <a:ext cx="6147435" cy="655320"/>
+          </a:xfrm>
+          <a:prstGeom prst="rect">
+            <a:avLst/>
+          </a:prstGeom>
+        </p:spPr>
+      </p:pic>
+      <p:sp>
+        <p:nvSpPr>
+          <p:cNvPr id="12" name="Text Box 11"/>
+          <p:cNvSpPr txBox="1"/>
+          <p:nvPr/>
+        </p:nvSpPr>
+        <p:spPr>
+          <a:xfrm>
+            <a:off x="2830195" y="4944110"/>
+            <a:ext cx="3482975" cy="916940"/>
+          </a:xfrm>
+          <a:prstGeom prst="rect">
+            <a:avLst/>
+          </a:prstGeom>
+          <a:noFill/>
+        </p:spPr>
+        <p:txBody>
+          <a:bodyPr wrap="square" rtlCol="0">
+            <a:spAutoFit/>
+          </a:bodyPr>
+          <a:p>
+            <a:pPr algn="ctr"/>
+            <a:r>
+              <a:rPr lang="en-MY" altLang="en-US"/>
+              <a:t>Casting in Java is basically like that, but with a lot more qualifying statements.</a:t>
+            </a:r>
+            <a:endParaRPr lang="en-MY" altLang="en-US"/>
+          </a:p>
+        </p:txBody>
+      </p:sp>
+    </p:spTree>
+  </p:cSld>
+  <p:clrMapOvr>
+    <a:masterClrMapping/>
+  </p:clrMapOvr>
+</p:sld>
+</file>
+
+<file path=ppt/slides/slide7.xml><?xml version="1.0" encoding="utf-8"?>
+<p:sld xmlns:a="http://schemas.openxmlformats.org/drawingml/2006/main" xmlns:r="http://schemas.openxmlformats.org/officeDocument/2006/relationships" xmlns:p="http://schemas.openxmlformats.org/presentationml/2006/main">
+  <p:cSld>
+    <p:spTree>
+      <p:nvGrpSpPr>
+        <p:cNvPr id="1" name=""/>
+        <p:cNvGrpSpPr/>
+        <p:nvPr/>
+      </p:nvGrpSpPr>
+      <p:grpSpPr/>
+      <p:sp>
+        <p:nvSpPr>
+          <p:cNvPr id="5" name="Text Box 4"/>
+          <p:cNvSpPr txBox="1"/>
+          <p:nvPr/>
+        </p:nvSpPr>
+        <p:spPr>
+          <a:xfrm>
+            <a:off x="495300" y="333375"/>
+            <a:ext cx="2086610" cy="829310"/>
+          </a:xfrm>
+          <a:prstGeom prst="rect">
+            <a:avLst/>
+          </a:prstGeom>
+          <a:noFill/>
+        </p:spPr>
+        <p:txBody>
+          <a:bodyPr wrap="none" rtlCol="0">
+            <a:spAutoFit/>
+          </a:bodyPr>
+          <a:p>
+            <a:r>
+              <a:rPr lang="en-MY" altLang="en-US" sz="4800"/>
+              <a:t>Thenks.</a:t>
+            </a:r>
+            <a:endParaRPr lang="en-MY" altLang="en-US" sz="4800"/>
           </a:p>
         </p:txBody>
       </p:sp>
@@ -4084,4 +4677,263 @@
     </a:ext>
   </a:extLst>
 </a:theme>
+</file>
+
+<file path=ppt/theme/theme2.xml><?xml version="1.0" encoding="utf-8"?>
+<a:theme xmlns:a="http://schemas.openxmlformats.org/drawingml/2006/main" name="Office Theme">
+  <a:themeElements>
+    <a:clrScheme name="Office">
+      <a:dk1>
+        <a:sysClr val="windowText" lastClr="000000"/>
+      </a:dk1>
+      <a:lt1>
+        <a:sysClr val="window" lastClr="FFFFFF"/>
+      </a:lt1>
+      <a:dk2>
+        <a:srgbClr val="44546A"/>
+      </a:dk2>
+      <a:lt2>
+        <a:srgbClr val="E7E6E6"/>
+      </a:lt2>
+      <a:accent1>
+        <a:srgbClr val="5B9BD5"/>
+      </a:accent1>
+      <a:accent2>
+        <a:srgbClr val="ED7D31"/>
+      </a:accent2>
+      <a:accent3>
+        <a:srgbClr val="A5A5A5"/>
+      </a:accent3>
+      <a:accent4>
+        <a:srgbClr val="FFC000"/>
+      </a:accent4>
+      <a:accent5>
+        <a:srgbClr val="4472C4"/>
+      </a:accent5>
+      <a:accent6>
+        <a:srgbClr val="70AD47"/>
+      </a:accent6>
+      <a:hlink>
+        <a:srgbClr val="0563C1"/>
+      </a:hlink>
+      <a:folHlink>
+        <a:srgbClr val="954F72"/>
+      </a:folHlink>
+    </a:clrScheme>
+    <a:fontScheme name="Office">
+      <a:majorFont>
+        <a:latin typeface="Calibri Light"/>
+        <a:ea typeface=""/>
+        <a:cs typeface=""/>
+        <a:font script="Jpan" typeface="ＭＳ Ｐゴシック"/>
+        <a:font script="Hang" typeface="맑은 고딕"/>
+        <a:font script="Hans" typeface="宋体"/>
+        <a:font script="Hant" typeface="新細明體"/>
+        <a:font script="Arab" typeface="Times New Roman"/>
+        <a:font script="Hebr" typeface="Times New Roman"/>
+        <a:font script="Thai" typeface="Angsana New"/>
+        <a:font script="Ethi" typeface="Nyala"/>
+        <a:font script="Beng" typeface="Vrinda"/>
+        <a:font script="Gujr" typeface="Shruti"/>
+        <a:font script="Khmr" typeface="MoolBoran"/>
+        <a:font script="Knda" typeface="Tunga"/>
+        <a:font script="Guru" typeface="Raavi"/>
+        <a:font script="Cans" typeface="Euphemia"/>
+        <a:font script="Cher" typeface="Plantagenet Cherokee"/>
+        <a:font script="Yiii" typeface="Microsoft Yi Baiti"/>
+        <a:font script="Tibt" typeface="Microsoft Himalaya"/>
+        <a:font script="Thaa" typeface="MV Boli"/>
+        <a:font script="Deva" typeface="Mangal"/>
+        <a:font script="Telu" typeface="Gautami"/>
+        <a:font script="Taml" typeface="Latha"/>
+        <a:font script="Syrc" typeface="Estrangelo Edessa"/>
+        <a:font script="Orya" typeface="Kalinga"/>
+        <a:font script="Mlym" typeface="Kartika"/>
+        <a:font script="Laoo" typeface="DokChampa"/>
+        <a:font script="Sinh" typeface="Iskoola Pota"/>
+        <a:font script="Mong" typeface="Mongolian Baiti"/>
+        <a:font script="Viet" typeface="Times New Roman"/>
+        <a:font script="Uigh" typeface="Microsoft Uighur"/>
+        <a:font script="Geor" typeface="Sylfaen"/>
+      </a:majorFont>
+      <a:minorFont>
+        <a:latin typeface="Calibri"/>
+        <a:ea typeface=""/>
+        <a:cs typeface=""/>
+        <a:font script="Jpan" typeface="ＭＳ Ｐゴシック"/>
+        <a:font script="Hang" typeface="맑은 고딕"/>
+        <a:font script="Hans" typeface="宋体"/>
+        <a:font script="Hant" typeface="新細明體"/>
+        <a:font script="Arab" typeface="Arial"/>
+        <a:font script="Hebr" typeface="Arial"/>
+        <a:font script="Thai" typeface="Cordia New"/>
+        <a:font script="Ethi" typeface="Nyala"/>
+        <a:font script="Beng" typeface="Vrinda"/>
+        <a:font script="Gujr" typeface="Shruti"/>
+        <a:font script="Khmr" typeface="DaunPenh"/>
+        <a:font script="Knda" typeface="Tunga"/>
+        <a:font script="Guru" typeface="Raavi"/>
+        <a:font script="Cans" typeface="Euphemia"/>
+        <a:font script="Cher" typeface="Plantagenet Cherokee"/>
+        <a:font script="Yiii" typeface="Microsoft Yi Baiti"/>
+        <a:font script="Tibt" typeface="Microsoft Himalaya"/>
+        <a:font script="Thaa" typeface="MV Boli"/>
+        <a:font script="Deva" typeface="Mangal"/>
+        <a:font script="Telu" typeface="Gautami"/>
+        <a:font script="Taml" typeface="Latha"/>
+        <a:font script="Syrc" typeface="Estrangelo Edessa"/>
+        <a:font script="Orya" typeface="Kalinga"/>
+        <a:font script="Mlym" typeface="Kartika"/>
+        <a:font script="Laoo" typeface="DokChampa"/>
+        <a:font script="Sinh" typeface="Iskoola Pota"/>
+        <a:font script="Mong" typeface="Mongolian Baiti"/>
+        <a:font script="Viet" typeface="Arial"/>
+        <a:font script="Uigh" typeface="Microsoft Uighur"/>
+        <a:font script="Geor" typeface="Sylfaen"/>
+      </a:minorFont>
+    </a:fontScheme>
+    <a:fmtScheme name="Office">
+      <a:fillStyleLst>
+        <a:solidFill>
+          <a:schemeClr val="phClr"/>
+        </a:solidFill>
+        <a:gradFill rotWithShape="1">
+          <a:gsLst>
+            <a:gs pos="0">
+              <a:schemeClr val="phClr">
+                <a:lumMod val="110000"/>
+                <a:satMod val="105000"/>
+                <a:tint val="67000"/>
+              </a:schemeClr>
+            </a:gs>
+            <a:gs pos="50000">
+              <a:schemeClr val="phClr">
+                <a:lumMod val="105000"/>
+                <a:satMod val="103000"/>
+                <a:tint val="73000"/>
+              </a:schemeClr>
+            </a:gs>
+            <a:gs pos="100000">
+              <a:schemeClr val="phClr">
+                <a:lumMod val="105000"/>
+                <a:satMod val="109000"/>
+                <a:tint val="81000"/>
+              </a:schemeClr>
+            </a:gs>
+          </a:gsLst>
+          <a:lin ang="5400000" scaled="0"/>
+        </a:gradFill>
+        <a:gradFill rotWithShape="1">
+          <a:gsLst>
+            <a:gs pos="0">
+              <a:schemeClr val="phClr">
+                <a:satMod val="103000"/>
+                <a:lumMod val="102000"/>
+                <a:tint val="94000"/>
+              </a:schemeClr>
+            </a:gs>
+            <a:gs pos="50000">
+              <a:schemeClr val="phClr">
+                <a:satMod val="110000"/>
+                <a:lumMod val="100000"/>
+                <a:shade val="100000"/>
+              </a:schemeClr>
+            </a:gs>
+            <a:gs pos="100000">
+              <a:schemeClr val="phClr">
+                <a:lumMod val="99000"/>
+                <a:satMod val="120000"/>
+                <a:shade val="78000"/>
+              </a:schemeClr>
+            </a:gs>
+          </a:gsLst>
+          <a:lin ang="5400000" scaled="0"/>
+        </a:gradFill>
+      </a:fillStyleLst>
+      <a:lnStyleLst>
+        <a:ln w="6350" cap="flat" cmpd="sng" algn="ctr">
+          <a:solidFill>
+            <a:schemeClr val="phClr"/>
+          </a:solidFill>
+          <a:prstDash val="solid"/>
+          <a:miter lim="800000"/>
+        </a:ln>
+        <a:ln w="12700" cap="flat" cmpd="sng" algn="ctr">
+          <a:solidFill>
+            <a:schemeClr val="phClr"/>
+          </a:solidFill>
+          <a:prstDash val="solid"/>
+          <a:miter lim="800000"/>
+        </a:ln>
+        <a:ln w="19050" cap="flat" cmpd="sng" algn="ctr">
+          <a:solidFill>
+            <a:schemeClr val="phClr"/>
+          </a:solidFill>
+          <a:prstDash val="solid"/>
+          <a:miter lim="800000"/>
+        </a:ln>
+      </a:lnStyleLst>
+      <a:effectStyleLst>
+        <a:effectStyle>
+          <a:effectLst/>
+        </a:effectStyle>
+        <a:effectStyle>
+          <a:effectLst/>
+        </a:effectStyle>
+        <a:effectStyle>
+          <a:effectLst>
+            <a:outerShdw blurRad="57150" dist="19050" dir="5400000" algn="ctr" rotWithShape="0">
+              <a:srgbClr val="000000">
+                <a:alpha val="63000"/>
+              </a:srgbClr>
+            </a:outerShdw>
+          </a:effectLst>
+        </a:effectStyle>
+      </a:effectStyleLst>
+      <a:bgFillStyleLst>
+        <a:solidFill>
+          <a:schemeClr val="phClr"/>
+        </a:solidFill>
+        <a:solidFill>
+          <a:schemeClr val="phClr">
+            <a:tint val="95000"/>
+            <a:satMod val="170000"/>
+          </a:schemeClr>
+        </a:solidFill>
+        <a:gradFill rotWithShape="1">
+          <a:gsLst>
+            <a:gs pos="0">
+              <a:schemeClr val="phClr">
+                <a:tint val="93000"/>
+                <a:satMod val="150000"/>
+                <a:shade val="98000"/>
+                <a:lumMod val="102000"/>
+              </a:schemeClr>
+            </a:gs>
+            <a:gs pos="50000">
+              <a:schemeClr val="phClr">
+                <a:tint val="98000"/>
+                <a:satMod val="130000"/>
+                <a:shade val="90000"/>
+                <a:lumMod val="103000"/>
+              </a:schemeClr>
+            </a:gs>
+            <a:gs pos="100000">
+              <a:schemeClr val="phClr">
+                <a:shade val="63000"/>
+                <a:satMod val="120000"/>
+              </a:schemeClr>
+            </a:gs>
+          </a:gsLst>
+          <a:lin ang="5400000" scaled="0"/>
+        </a:gradFill>
+      </a:bgFillStyleLst>
+    </a:fmtScheme>
+  </a:themeElements>
+  <a:extLst>
+    <a:ext uri="{05A4C25C-085E-4340-85A3-A5531E510DB2}">
+      <thm15:themeFamily xmlns:thm15="http://schemas.microsoft.com/office/thememl/2012/main" name="Office Theme" id="{62F939B6-93AF-4DB8-9C6B-D6C7DFDC589F}" vid="{4A3C46E8-61CC-4603-A589-7422A47A8E4A}"/>
+    </a:ext>
+  </a:extLst>
+</a:theme>
 </file>
</xml_diff>